<commit_message>
added slides and stuff
</commit_message>
<xml_diff>
--- a/slides/module2.pptx
+++ b/slides/module2.pptx
@@ -134,10 +134,10 @@
   </p:defaultTextStyle>
   <p:extLst>
     <p:ext uri="{EFAFB233-063F-42B5-8137-9DF3F51BA10A}">
-      <p15:sldGuideLst xmlns="" xmlns:p15="http://schemas.microsoft.com/office/powerpoint/2012/main"/>
+      <p15:sldGuideLst xmlns:p15="http://schemas.microsoft.com/office/powerpoint/2012/main" xmlns=""/>
     </p:ext>
     <p:ext uri="{2D200454-40CA-4A62-9FC3-DE9A4176ACB9}">
-      <p15:notesGuideLst xmlns="" xmlns:p15="http://schemas.microsoft.com/office/powerpoint/2012/main"/>
+      <p15:notesGuideLst xmlns:p15="http://schemas.microsoft.com/office/powerpoint/2012/main" xmlns=""/>
     </p:ext>
   </p:extLst>
 </p:presentation>
@@ -1617,7 +1617,7 @@
   </p:timing>
   <p:extLst mod="1">
     <p:ext uri="{DCECCB84-F9BA-43D5-87BE-67443E8EF086}">
-      <p15:sldGuideLst xmlns="" xmlns:p15="http://schemas.microsoft.com/office/powerpoint/2012/main">
+      <p15:sldGuideLst xmlns:p15="http://schemas.microsoft.com/office/powerpoint/2012/main" xmlns="">
         <p15:guide id="1" orient="horz" pos="3792">
           <p15:clr>
             <a:srgbClr val="FBAE40"/>
@@ -2276,7 +2276,7 @@
   </p:timing>
   <p:extLst mod="1">
     <p:ext uri="{DCECCB84-F9BA-43D5-87BE-67443E8EF086}">
-      <p15:sldGuideLst xmlns="" xmlns:p15="http://schemas.microsoft.com/office/powerpoint/2012/main">
+      <p15:sldGuideLst xmlns:p15="http://schemas.microsoft.com/office/powerpoint/2012/main" xmlns="">
         <p15:guide id="1" orient="horz" pos="2160">
           <p15:clr>
             <a:srgbClr val="FBAE40"/>
@@ -4095,11 +4095,7 @@
           <a:p>
             <a:r>
               <a:rPr lang="en-US" dirty="0" smtClean="0"/>
-              <a:t>Models </a:t>
-            </a:r>
-            <a:r>
-              <a:rPr lang="en-US" dirty="0" smtClean="0"/>
-              <a:t>and Controllers</a:t>
+              <a:t>Models and Controllers</a:t>
             </a:r>
             <a:endParaRPr lang="en-US" dirty="0"/>
           </a:p>
@@ -4742,11 +4738,7 @@
           <a:p>
             <a:r>
               <a:rPr lang="en-US" dirty="0" smtClean="0"/>
-              <a:t>Displaying </a:t>
-            </a:r>
-            <a:r>
-              <a:rPr lang="en-US" dirty="0" smtClean="0"/>
-              <a:t>and Binding Data</a:t>
+              <a:t>Displaying and Binding Data</a:t>
             </a:r>
             <a:endParaRPr lang="en-US" dirty="0"/>
           </a:p>
@@ -4802,7 +4794,6 @@
               <a:rPr lang="en-US" dirty="0" smtClean="0"/>
               <a:t>-bind for one way data binding</a:t>
             </a:r>
-            <a:endParaRPr lang="en-US" dirty="0" smtClean="0"/>
           </a:p>
           <a:p>
             <a:pPr marL="457046" lvl="1" indent="0">
@@ -4943,11 +4934,7 @@
           <a:p>
             <a:r>
               <a:rPr lang="en-US" dirty="0" smtClean="0"/>
-              <a:t>Ser</a:t>
-            </a:r>
-            <a:r>
-              <a:rPr lang="en-US" dirty="0" smtClean="0"/>
-              <a:t>vices</a:t>
+              <a:t>Services</a:t>
             </a:r>
             <a:endParaRPr lang="en-US" dirty="0"/>
           </a:p>
@@ -4982,11 +4969,7 @@
           <a:p>
             <a:r>
               <a:rPr lang="en-US" dirty="0" smtClean="0"/>
-              <a:t>Share </a:t>
-            </a:r>
-            <a:r>
-              <a:rPr lang="en-US" dirty="0" smtClean="0"/>
-              <a:t>data between controllers</a:t>
+              <a:t>Share data between controllers</a:t>
             </a:r>
           </a:p>
           <a:p>
@@ -5053,38 +5036,56 @@
         <p:spPr/>
         <p:txBody>
           <a:bodyPr>
-            <a:normAutofit/>
+            <a:normAutofit fontScale="92500" lnSpcReduction="10000"/>
           </a:bodyPr>
           <a:lstStyle/>
           <a:p>
             <a:r>
               <a:rPr lang="en-GB" dirty="0" smtClean="0"/>
-              <a:t>What’s a front end framework?</a:t>
-            </a:r>
-          </a:p>
-          <a:p>
+              <a:t>What’s a front end framework</a:t>
+            </a:r>
             <a:r>
               <a:rPr lang="en-GB" dirty="0" smtClean="0"/>
+              <a:t>?</a:t>
+            </a:r>
+          </a:p>
+          <a:p>
+            <a:endParaRPr lang="en-GB" dirty="0" smtClean="0"/>
+          </a:p>
+          <a:p>
+            <a:r>
+              <a:rPr lang="en-GB" smtClean="0"/>
               <a:t>Directives</a:t>
             </a:r>
           </a:p>
           <a:p>
+            <a:endParaRPr lang="en-GB" dirty="0" smtClean="0"/>
+          </a:p>
+          <a:p>
             <a:r>
               <a:rPr lang="en-GB" dirty="0" smtClean="0"/>
-              <a:t>Modules &amp; Controllers</a:t>
-            </a:r>
-          </a:p>
-          <a:p>
+              <a:t>Modules &amp; </a:t>
+            </a:r>
             <a:r>
               <a:rPr lang="en-GB" dirty="0" smtClean="0"/>
-              <a:t>Models &amp; Data Binding</a:t>
-            </a:r>
+              <a:t>Controllers</a:t>
+            </a:r>
+          </a:p>
+          <a:p>
+            <a:endParaRPr lang="en-GB" dirty="0" smtClean="0"/>
           </a:p>
           <a:p>
             <a:r>
               <a:rPr lang="en-GB" dirty="0" smtClean="0"/>
-              <a:t>Services</a:t>
-            </a:r>
+              <a:t>Models &amp; Data </a:t>
+            </a:r>
+            <a:r>
+              <a:rPr lang="en-GB" dirty="0" smtClean="0"/>
+              <a:t>Binding</a:t>
+            </a:r>
+          </a:p>
+          <a:p>
+            <a:endParaRPr lang="en-GB" dirty="0" smtClean="0"/>
           </a:p>
           <a:p>
             <a:r>
@@ -5279,15 +5280,7 @@
           <a:p>
             <a:r>
               <a:rPr lang="en-US" dirty="0" smtClean="0"/>
-              <a:t>Must </a:t>
-            </a:r>
-            <a:r>
-              <a:rPr lang="en-US" dirty="0" smtClean="0"/>
-              <a:t>pass </a:t>
-            </a:r>
-            <a:r>
-              <a:rPr lang="en-US" dirty="0" smtClean="0"/>
-              <a:t>`</a:t>
+              <a:t>Must pass `</a:t>
             </a:r>
             <a:r>
               <a:rPr lang="en-US" dirty="0" err="1" smtClean="0"/>
@@ -5311,7 +5304,6 @@
               <a:rPr lang="en-US" dirty="0" smtClean="0"/>
               <a:t> and uses the appropriate template</a:t>
             </a:r>
-            <a:endParaRPr lang="en-US" dirty="0" smtClean="0"/>
           </a:p>
           <a:p>
             <a:endParaRPr lang="en-US" dirty="0" smtClean="0"/>
@@ -5470,11 +5462,7 @@
           <a:p>
             <a:r>
               <a:rPr lang="en-US" dirty="0" smtClean="0"/>
-              <a:t>Front </a:t>
-            </a:r>
-            <a:r>
-              <a:rPr lang="en-US" dirty="0" smtClean="0"/>
-              <a:t>End Frameworks</a:t>
+              <a:t>Front End Frameworks</a:t>
             </a:r>
             <a:endParaRPr lang="en-US" dirty="0"/>
           </a:p>
@@ -5587,7 +5575,6 @@
               <a:rPr lang="en-US" dirty="0" smtClean="0"/>
               <a:t> interactions less painful</a:t>
             </a:r>
-            <a:endParaRPr lang="en-US" dirty="0" smtClean="0"/>
           </a:p>
           <a:p>
             <a:r>
@@ -5596,11 +5583,7 @@
             </a:r>
             <a:r>
               <a:rPr lang="en-US" dirty="0" smtClean="0"/>
-              <a:t> is an MVC framework. </a:t>
-            </a:r>
-            <a:r>
-              <a:rPr lang="en-US" dirty="0" smtClean="0"/>
-              <a:t>You use it to structure out your application looks (view) from your data (model) and the logic and functions that are executed (controller). It’s also extremely test driven.</a:t>
+              <a:t> is an MVC framework. You use it to structure out your application looks (view) from your data (model) and the logic and functions that are executed (controller). It’s also extremely test driven.</a:t>
             </a:r>
             <a:endParaRPr lang="en-US" b="1" dirty="0"/>
           </a:p>
@@ -5679,30 +5662,16 @@
                 <a:latin typeface="Segoe UI Light"/>
                 <a:cs typeface="Segoe UI Light"/>
               </a:rPr>
-              <a:t>“What HTML would look </a:t>
-            </a:r>
+              <a:t>“What HTML would look like if it was designed fro web apps”</a:t>
+            </a:r>
+          </a:p>
+          <a:p>
             <a:r>
               <a:rPr lang="en-US" dirty="0" smtClean="0">
                 <a:latin typeface="Segoe UI Light"/>
                 <a:cs typeface="Segoe UI Light"/>
               </a:rPr>
-              <a:t>like if it was designed fro web apps”</a:t>
-            </a:r>
-          </a:p>
-          <a:p>
-            <a:r>
-              <a:rPr lang="en-US" dirty="0" smtClean="0">
-                <a:latin typeface="Segoe UI Light"/>
-                <a:cs typeface="Segoe UI Light"/>
-              </a:rPr>
-              <a:t>Keep </a:t>
-            </a:r>
-            <a:r>
-              <a:rPr lang="en-US" dirty="0" smtClean="0">
-                <a:latin typeface="Segoe UI Light"/>
-                <a:cs typeface="Segoe UI Light"/>
-              </a:rPr>
-              <a:t>your code organized and structured</a:t>
+              <a:t>Keep your code organized and structured</a:t>
             </a:r>
           </a:p>
           <a:p>
@@ -5720,30 +5689,16 @@
                 <a:latin typeface="Segoe UI Light"/>
                 <a:cs typeface="Segoe UI Light"/>
               </a:rPr>
-              <a:t>Great for single page </a:t>
-            </a:r>
+              <a:t>Great for single page applications</a:t>
+            </a:r>
+          </a:p>
+          <a:p>
             <a:r>
               <a:rPr lang="en-US" dirty="0" smtClean="0">
                 <a:latin typeface="Segoe UI Light"/>
                 <a:cs typeface="Segoe UI Light"/>
               </a:rPr>
-              <a:t>applications</a:t>
-            </a:r>
-          </a:p>
-          <a:p>
-            <a:r>
-              <a:rPr lang="en-US" dirty="0" smtClean="0">
-                <a:latin typeface="Segoe UI Light"/>
-                <a:cs typeface="Segoe UI Light"/>
-              </a:rPr>
-              <a:t>Easy </a:t>
-            </a:r>
-            <a:r>
-              <a:rPr lang="en-US" dirty="0" smtClean="0">
-                <a:latin typeface="Segoe UI Light"/>
-                <a:cs typeface="Segoe UI Light"/>
-              </a:rPr>
-              <a:t>to test</a:t>
+              <a:t>Easy to test</a:t>
             </a:r>
           </a:p>
           <a:p>
@@ -6089,11 +6044,7 @@
           <a:p>
             <a:r>
               <a:rPr lang="en-US" dirty="0" smtClean="0"/>
-              <a:t>Attaches </a:t>
-            </a:r>
-            <a:r>
-              <a:rPr lang="en-US" dirty="0" smtClean="0"/>
-              <a:t>some specific behavior to the element</a:t>
+              <a:t>Attaches some specific behavior to the element</a:t>
             </a:r>
           </a:p>
           <a:p>
@@ -6679,7 +6630,7 @@
   <a:extraClrSchemeLst/>
   <a:extLst>
     <a:ext uri="{05A4C25C-085E-4340-85A3-A5531E510DB2}">
-      <thm15:themeFamily xmlns="" xmlns:thm15="http://schemas.microsoft.com/office/thememl/2012/main" name="Office Theme" id="{62F939B6-93AF-4DB8-9C6B-D6C7DFDC589F}" vid="{4A3C46E8-61CC-4603-A589-7422A47A8E4A}"/>
+      <thm15:themeFamily xmlns:thm15="http://schemas.microsoft.com/office/thememl/2012/main" xmlns="" name="Office Theme" id="{62F939B6-93AF-4DB8-9C6B-D6C7DFDC589F}" vid="{4A3C46E8-61CC-4603-A589-7422A47A8E4A}"/>
     </a:ext>
   </a:extLst>
 </a:theme>
@@ -6940,7 +6891,7 @@
   <a:extraClrSchemeLst/>
   <a:extLst>
     <a:ext uri="{05A4C25C-085E-4340-85A3-A5531E510DB2}">
-      <thm15:themeFamily xmlns="" xmlns:thm15="http://schemas.microsoft.com/office/thememl/2012/main" name="Office Theme" id="{62F939B6-93AF-4DB8-9C6B-D6C7DFDC589F}" vid="{4A3C46E8-61CC-4603-A589-7422A47A8E4A}"/>
+      <thm15:themeFamily xmlns:thm15="http://schemas.microsoft.com/office/thememl/2012/main" xmlns="" name="Office Theme" id="{62F939B6-93AF-4DB8-9C6B-D6C7DFDC589F}" vid="{4A3C46E8-61CC-4603-A589-7422A47A8E4A}"/>
     </a:ext>
   </a:extLst>
 </a:theme>

</xml_diff>

<commit_message>
subheadings for module 2
</commit_message>
<xml_diff>
--- a/slides/module2.pptx
+++ b/slides/module2.pptx
@@ -5,10 +5,10 @@
     <p:sldMasterId id="2147483660" r:id="rId4"/>
   </p:sldMasterIdLst>
   <p:notesMasterIdLst>
-    <p:notesMasterId r:id="rId26"/>
+    <p:notesMasterId r:id="rId28"/>
   </p:notesMasterIdLst>
   <p:handoutMasterIdLst>
-    <p:handoutMasterId r:id="rId27"/>
+    <p:handoutMasterId r:id="rId29"/>
   </p:handoutMasterIdLst>
   <p:sldIdLst>
     <p:sldId id="277" r:id="rId5"/>
@@ -22,16 +22,18 @@
     <p:sldId id="287" r:id="rId13"/>
     <p:sldId id="288" r:id="rId14"/>
     <p:sldId id="290" r:id="rId15"/>
-    <p:sldId id="308" r:id="rId16"/>
-    <p:sldId id="294" r:id="rId17"/>
+    <p:sldId id="294" r:id="rId16"/>
+    <p:sldId id="308" r:id="rId17"/>
     <p:sldId id="309" r:id="rId18"/>
-    <p:sldId id="293" r:id="rId19"/>
-    <p:sldId id="296" r:id="rId20"/>
-    <p:sldId id="298" r:id="rId21"/>
-    <p:sldId id="299" r:id="rId22"/>
-    <p:sldId id="302" r:id="rId23"/>
-    <p:sldId id="310" r:id="rId24"/>
-    <p:sldId id="269" r:id="rId25"/>
+    <p:sldId id="311" r:id="rId19"/>
+    <p:sldId id="293" r:id="rId20"/>
+    <p:sldId id="296" r:id="rId21"/>
+    <p:sldId id="298" r:id="rId22"/>
+    <p:sldId id="312" r:id="rId23"/>
+    <p:sldId id="299" r:id="rId24"/>
+    <p:sldId id="302" r:id="rId25"/>
+    <p:sldId id="310" r:id="rId26"/>
+    <p:sldId id="269" r:id="rId27"/>
   </p:sldIdLst>
   <p:sldSz cx="12192000" cy="6858000"/>
   <p:notesSz cx="6858000" cy="9144000"/>
@@ -132,10 +134,10 @@
   </p:defaultTextStyle>
   <p:extLst>
     <p:ext uri="{EFAFB233-063F-42B5-8137-9DF3F51BA10A}">
-      <p15:sldGuideLst xmlns="" xmlns:p15="http://schemas.microsoft.com/office/powerpoint/2012/main"/>
+      <p15:sldGuideLst xmlns:p15="http://schemas.microsoft.com/office/powerpoint/2012/main" xmlns=""/>
     </p:ext>
     <p:ext uri="{2D200454-40CA-4A62-9FC3-DE9A4176ACB9}">
-      <p15:notesGuideLst xmlns="" xmlns:p15="http://schemas.microsoft.com/office/powerpoint/2012/main"/>
+      <p15:notesGuideLst xmlns:p15="http://schemas.microsoft.com/office/powerpoint/2012/main" xmlns=""/>
     </p:ext>
   </p:extLst>
 </p:presentation>
@@ -223,7 +225,7 @@
           <a:p>
             <a:fld id="{312E7B4A-039C-48A2-9B2C-AF16AA3873D8}" type="datetimeFigureOut">
               <a:rPr lang="en-US" smtClean="0"/>
-              <a:t>2/16/15</a:t>
+              <a:t>2/17/15</a:t>
             </a:fld>
             <a:endParaRPr lang="en-US"/>
           </a:p>
@@ -388,7 +390,7 @@
           <a:p>
             <a:fld id="{DA005A0C-54D9-45AA-87D4-C551D08DFCE1}" type="datetimeFigureOut">
               <a:rPr lang="en-US" smtClean="0"/>
-              <a:t>2/16/15</a:t>
+              <a:t>2/17/15</a:t>
             </a:fld>
             <a:endParaRPr lang="en-US"/>
           </a:p>
@@ -1221,6 +1223,234 @@
 </p:notes>
 </file>
 
+<file path=ppt/notesSlides/notesSlide7.xml><?xml version="1.0" encoding="utf-8"?>
+<p:notes xmlns:a="http://schemas.openxmlformats.org/drawingml/2006/main" xmlns:r="http://schemas.openxmlformats.org/officeDocument/2006/relationships" xmlns:p="http://schemas.openxmlformats.org/presentationml/2006/main">
+  <p:cSld>
+    <p:spTree>
+      <p:nvGrpSpPr>
+        <p:cNvPr id="1" name=""/>
+        <p:cNvGrpSpPr/>
+        <p:nvPr/>
+      </p:nvGrpSpPr>
+      <p:grpSpPr>
+        <a:xfrm>
+          <a:off x="0" y="0"/>
+          <a:ext cx="0" cy="0"/>
+          <a:chOff x="0" y="0"/>
+          <a:chExt cx="0" cy="0"/>
+        </a:xfrm>
+      </p:grpSpPr>
+      <p:sp>
+        <p:nvSpPr>
+          <p:cNvPr id="2" name="Slide Image Placeholder 1"/>
+          <p:cNvSpPr>
+            <a:spLocks noGrp="1" noRot="1" noChangeAspect="1"/>
+          </p:cNvSpPr>
+          <p:nvPr>
+            <p:ph type="sldImg"/>
+          </p:nvPr>
+        </p:nvSpPr>
+        <p:spPr/>
+      </p:sp>
+      <p:sp>
+        <p:nvSpPr>
+          <p:cNvPr id="3" name="Notes Placeholder 2"/>
+          <p:cNvSpPr>
+            <a:spLocks noGrp="1"/>
+          </p:cNvSpPr>
+          <p:nvPr>
+            <p:ph type="body" idx="1"/>
+          </p:nvPr>
+        </p:nvSpPr>
+        <p:spPr/>
+        <p:txBody>
+          <a:bodyPr/>
+          <a:lstStyle/>
+          <a:p>
+            <a:r>
+              <a:rPr lang="en-US" dirty="0" smtClean="0"/>
+              <a:t>Create Angular module</a:t>
+            </a:r>
+          </a:p>
+          <a:p>
+            <a:endParaRPr lang="en-US" dirty="0" smtClean="0"/>
+          </a:p>
+          <a:p>
+            <a:r>
+              <a:rPr lang="en-US" dirty="0" smtClean="0"/>
+              <a:t>Create </a:t>
+            </a:r>
+            <a:r>
+              <a:rPr lang="en-US" dirty="0" err="1" smtClean="0"/>
+              <a:t>main.html</a:t>
+            </a:r>
+            <a:endParaRPr lang="en-US" dirty="0" smtClean="0"/>
+          </a:p>
+          <a:p>
+            <a:endParaRPr lang="en-US" dirty="0" smtClean="0"/>
+          </a:p>
+          <a:p>
+            <a:r>
+              <a:rPr lang="en-US" dirty="0" smtClean="0"/>
+              <a:t>Add</a:t>
+            </a:r>
+            <a:r>
+              <a:rPr lang="en-US" baseline="0" dirty="0" smtClean="0"/>
+              <a:t> Angular in</a:t>
+            </a:r>
+          </a:p>
+          <a:p>
+            <a:endParaRPr lang="en-US" baseline="0" dirty="0" smtClean="0"/>
+          </a:p>
+          <a:p>
+            <a:r>
+              <a:rPr lang="en-US" baseline="0" dirty="0" smtClean="0"/>
+              <a:t>Create a controller. Leave it empty for now.</a:t>
+            </a:r>
+            <a:endParaRPr lang="en-US" dirty="0"/>
+          </a:p>
+        </p:txBody>
+      </p:sp>
+      <p:sp>
+        <p:nvSpPr>
+          <p:cNvPr id="4" name="Slide Number Placeholder 3"/>
+          <p:cNvSpPr>
+            <a:spLocks noGrp="1"/>
+          </p:cNvSpPr>
+          <p:nvPr>
+            <p:ph type="sldNum" sz="quarter" idx="10"/>
+          </p:nvPr>
+        </p:nvSpPr>
+        <p:spPr/>
+        <p:txBody>
+          <a:bodyPr/>
+          <a:lstStyle/>
+          <a:p>
+            <a:fld id="{4CFD207A-07DF-40AD-A916-9872E089CE7A}" type="slidenum">
+              <a:rPr lang="en-US" smtClean="0"/>
+              <a:t>15</a:t>
+            </a:fld>
+            <a:endParaRPr lang="en-US"/>
+          </a:p>
+        </p:txBody>
+      </p:sp>
+    </p:spTree>
+    <p:extLst>
+      <p:ext uri="{BB962C8B-B14F-4D97-AF65-F5344CB8AC3E}">
+        <p14:creationId xmlns:p14="http://schemas.microsoft.com/office/powerpoint/2010/main" val="203996711"/>
+      </p:ext>
+    </p:extLst>
+  </p:cSld>
+  <p:clrMapOvr>
+    <a:masterClrMapping/>
+  </p:clrMapOvr>
+</p:notes>
+</file>
+
+<file path=ppt/notesSlides/notesSlide8.xml><?xml version="1.0" encoding="utf-8"?>
+<p:notes xmlns:a="http://schemas.openxmlformats.org/drawingml/2006/main" xmlns:r="http://schemas.openxmlformats.org/officeDocument/2006/relationships" xmlns:p="http://schemas.openxmlformats.org/presentationml/2006/main">
+  <p:cSld>
+    <p:spTree>
+      <p:nvGrpSpPr>
+        <p:cNvPr id="1" name=""/>
+        <p:cNvGrpSpPr/>
+        <p:nvPr/>
+      </p:nvGrpSpPr>
+      <p:grpSpPr>
+        <a:xfrm>
+          <a:off x="0" y="0"/>
+          <a:ext cx="0" cy="0"/>
+          <a:chOff x="0" y="0"/>
+          <a:chExt cx="0" cy="0"/>
+        </a:xfrm>
+      </p:grpSpPr>
+      <p:sp>
+        <p:nvSpPr>
+          <p:cNvPr id="2" name="Slide Image Placeholder 1"/>
+          <p:cNvSpPr>
+            <a:spLocks noGrp="1" noRot="1" noChangeAspect="1"/>
+          </p:cNvSpPr>
+          <p:nvPr>
+            <p:ph type="sldImg"/>
+          </p:nvPr>
+        </p:nvSpPr>
+        <p:spPr/>
+      </p:sp>
+      <p:sp>
+        <p:nvSpPr>
+          <p:cNvPr id="3" name="Notes Placeholder 2"/>
+          <p:cNvSpPr>
+            <a:spLocks noGrp="1"/>
+          </p:cNvSpPr>
+          <p:nvPr>
+            <p:ph type="body" idx="1"/>
+          </p:nvPr>
+        </p:nvSpPr>
+        <p:spPr/>
+        <p:txBody>
+          <a:bodyPr/>
+          <a:lstStyle/>
+          <a:p>
+            <a:r>
+              <a:rPr lang="en-US" dirty="0" smtClean="0"/>
+              <a:t>Create</a:t>
+            </a:r>
+            <a:r>
+              <a:rPr lang="en-US" baseline="0" dirty="0" smtClean="0"/>
+              <a:t> posts, </a:t>
+            </a:r>
+            <a:r>
+              <a:rPr lang="en-US" baseline="0" dirty="0" err="1" smtClean="0"/>
+              <a:t>newPost</a:t>
+            </a:r>
+            <a:r>
+              <a:rPr lang="en-US" baseline="0" dirty="0" smtClean="0"/>
+              <a:t>, and a </a:t>
+            </a:r>
+            <a:r>
+              <a:rPr lang="en-US" baseline="0" smtClean="0"/>
+              <a:t>posting function</a:t>
+            </a:r>
+            <a:endParaRPr lang="en-US"/>
+          </a:p>
+        </p:txBody>
+      </p:sp>
+      <p:sp>
+        <p:nvSpPr>
+          <p:cNvPr id="4" name="Slide Number Placeholder 3"/>
+          <p:cNvSpPr>
+            <a:spLocks noGrp="1"/>
+          </p:cNvSpPr>
+          <p:nvPr>
+            <p:ph type="sldNum" sz="quarter" idx="10"/>
+          </p:nvPr>
+        </p:nvSpPr>
+        <p:spPr/>
+        <p:txBody>
+          <a:bodyPr/>
+          <a:lstStyle/>
+          <a:p>
+            <a:fld id="{4CFD207A-07DF-40AD-A916-9872E089CE7A}" type="slidenum">
+              <a:rPr lang="en-US" smtClean="0"/>
+              <a:t>19</a:t>
+            </a:fld>
+            <a:endParaRPr lang="en-US"/>
+          </a:p>
+        </p:txBody>
+      </p:sp>
+    </p:spTree>
+    <p:extLst>
+      <p:ext uri="{BB962C8B-B14F-4D97-AF65-F5344CB8AC3E}">
+        <p14:creationId xmlns:p14="http://schemas.microsoft.com/office/powerpoint/2010/main" val="1048017110"/>
+      </p:ext>
+    </p:extLst>
+  </p:cSld>
+  <p:clrMapOvr>
+    <a:masterClrMapping/>
+  </p:clrMapOvr>
+</p:notes>
+</file>
+
 <file path=ppt/slideLayouts/slideLayout1.xml><?xml version="1.0" encoding="utf-8"?>
 <p:sldLayout xmlns:a="http://schemas.openxmlformats.org/drawingml/2006/main" xmlns:r="http://schemas.openxmlformats.org/officeDocument/2006/relationships" xmlns:p="http://schemas.openxmlformats.org/presentationml/2006/main" preserve="1" userDrawn="1">
   <p:cSld name="Title Slide">
@@ -1615,7 +1845,7 @@
   </p:timing>
   <p:extLst mod="1">
     <p:ext uri="{DCECCB84-F9BA-43D5-87BE-67443E8EF086}">
-      <p15:sldGuideLst xmlns="" xmlns:p15="http://schemas.microsoft.com/office/powerpoint/2012/main">
+      <p15:sldGuideLst xmlns:p15="http://schemas.microsoft.com/office/powerpoint/2012/main" xmlns="">
         <p15:guide id="1" orient="horz" pos="3792">
           <p15:clr>
             <a:srgbClr val="FBAE40"/>
@@ -2274,7 +2504,7 @@
   </p:timing>
   <p:extLst mod="1">
     <p:ext uri="{DCECCB84-F9BA-43D5-87BE-67443E8EF086}">
-      <p15:sldGuideLst xmlns="" xmlns:p15="http://schemas.microsoft.com/office/powerpoint/2012/main">
+      <p15:sldGuideLst xmlns:p15="http://schemas.microsoft.com/office/powerpoint/2012/main" xmlns="">
         <p15:guide id="1" orient="horz" pos="2160">
           <p15:clr>
             <a:srgbClr val="FBAE40"/>
@@ -4281,7 +4511,7 @@
           <a:p>
             <a:r>
               <a:rPr lang="en-US" dirty="0" smtClean="0"/>
-              <a:t>Dependency Injection</a:t>
+              <a:t>Controllers</a:t>
             </a:r>
             <a:endParaRPr lang="en-US" dirty="0"/>
           </a:p>
@@ -4304,16 +4534,60 @@
           <a:p>
             <a:r>
               <a:rPr lang="en-US" dirty="0" smtClean="0"/>
-              <a:t>How we specify the dependencies that an Angular component will need.</a:t>
-            </a:r>
+              <a:t>Contains </a:t>
+            </a:r>
+            <a:r>
+              <a:rPr lang="en-US" dirty="0" smtClean="0"/>
+              <a:t>the business logic for a part of your application</a:t>
+            </a:r>
+          </a:p>
+          <a:p>
+            <a:endParaRPr lang="en-US" dirty="0" smtClean="0"/>
+          </a:p>
+          <a:p>
+            <a:r>
+              <a:rPr lang="en-US" dirty="0" smtClean="0"/>
+              <a:t>Sets up your data to be viewed in your HTML</a:t>
+            </a:r>
+          </a:p>
+          <a:p>
             <a:endParaRPr lang="en-US" dirty="0"/>
+          </a:p>
+          <a:p>
+            <a:r>
+              <a:rPr lang="en-US" dirty="0" err="1" smtClean="0"/>
+              <a:t>myModule.controller</a:t>
+            </a:r>
+            <a:r>
+              <a:rPr lang="en-US" dirty="0" smtClean="0"/>
+              <a:t>(‘</a:t>
+            </a:r>
+            <a:r>
+              <a:rPr lang="en-US" dirty="0" err="1" smtClean="0"/>
+              <a:t>myController</a:t>
+            </a:r>
+            <a:r>
+              <a:rPr lang="en-US" dirty="0" smtClean="0"/>
+              <a:t>’, function($scope){</a:t>
+            </a:r>
+            <a:r>
+              <a:rPr lang="en-US" dirty="0"/>
+              <a:t/>
+            </a:r>
+            <a:br>
+              <a:rPr lang="en-US" dirty="0"/>
+            </a:br>
+            <a:r>
+              <a:rPr lang="en-US" dirty="0" smtClean="0"/>
+              <a:t>});</a:t>
+            </a:r>
           </a:p>
         </p:txBody>
       </p:sp>
     </p:spTree>
     <p:extLst>
       <p:ext uri="{BB962C8B-B14F-4D97-AF65-F5344CB8AC3E}">
-        <p14:creationId xmlns:p14="http://schemas.microsoft.com/office/powerpoint/2010/main" val="1155072084"/>
+        <p14:creationId xmlns:p14="http://schemas.microsoft.com/office/powerpoint/2010/main" val="920728789"/>
       </p:ext>
     </p:extLst>
   </p:cSld>
@@ -4357,7 +4631,7 @@
           <a:p>
             <a:r>
               <a:rPr lang="en-US" dirty="0" smtClean="0"/>
-              <a:t>Controllers</a:t>
+              <a:t>Dependency Injection</a:t>
             </a:r>
             <a:endParaRPr lang="en-US" dirty="0"/>
           </a:p>
@@ -4380,56 +4654,16 @@
           <a:p>
             <a:r>
               <a:rPr lang="en-US" dirty="0" smtClean="0"/>
-              <a:t>Contains the business logic for a part of your application</a:t>
-            </a:r>
-          </a:p>
-          <a:p>
-            <a:endParaRPr lang="en-US" dirty="0" smtClean="0"/>
-          </a:p>
-          <a:p>
-            <a:r>
-              <a:rPr lang="en-US" dirty="0" smtClean="0"/>
-              <a:t>Sets up your data to be viewed in your HTML</a:t>
-            </a:r>
-          </a:p>
-          <a:p>
+              <a:t>How we specify the dependencies that an Angular component will need.</a:t>
+            </a:r>
             <a:endParaRPr lang="en-US" dirty="0"/>
-          </a:p>
-          <a:p>
-            <a:r>
-              <a:rPr lang="en-US" dirty="0" err="1" smtClean="0"/>
-              <a:t>myModule.controller</a:t>
-            </a:r>
-            <a:r>
-              <a:rPr lang="en-US" dirty="0" smtClean="0"/>
-              <a:t>(‘</a:t>
-            </a:r>
-            <a:r>
-              <a:rPr lang="en-US" dirty="0" err="1" smtClean="0"/>
-              <a:t>myController</a:t>
-            </a:r>
-            <a:r>
-              <a:rPr lang="en-US" dirty="0" smtClean="0"/>
-              <a:t>’, function($scope){</a:t>
-            </a:r>
-            <a:r>
-              <a:rPr lang="en-US" dirty="0"/>
-              <a:t/>
-            </a:r>
-            <a:br>
-              <a:rPr lang="en-US" dirty="0"/>
-            </a:br>
-            <a:r>
-              <a:rPr lang="en-US" dirty="0" smtClean="0"/>
-              <a:t>});</a:t>
-            </a:r>
           </a:p>
         </p:txBody>
       </p:sp>
     </p:spTree>
     <p:extLst>
       <p:ext uri="{BB962C8B-B14F-4D97-AF65-F5344CB8AC3E}">
-        <p14:creationId xmlns:p14="http://schemas.microsoft.com/office/powerpoint/2010/main" val="920728789"/>
+        <p14:creationId xmlns:p14="http://schemas.microsoft.com/office/powerpoint/2010/main" val="1155072084"/>
       </p:ext>
     </p:extLst>
   </p:cSld>
@@ -4552,12 +4786,12 @@
       </p:grpSpPr>
       <p:sp>
         <p:nvSpPr>
-          <p:cNvPr id="5" name="Text Placeholder 4"/>
-          <p:cNvSpPr>
-            <a:spLocks noGrp="1"/>
-          </p:cNvSpPr>
-          <p:nvPr>
-            <p:ph type="body" sz="quarter" idx="10"/>
+          <p:cNvPr id="2" name="Title 1"/>
+          <p:cNvSpPr>
+            <a:spLocks noGrp="1"/>
+          </p:cNvSpPr>
+          <p:nvPr>
+            <p:ph type="title"/>
           </p:nvPr>
         </p:nvSpPr>
         <p:spPr/>
@@ -4565,37 +4799,14 @@
           <a:bodyPr/>
           <a:lstStyle/>
           <a:p>
-            <a:r>
-              <a:rPr lang="en-US" dirty="0" smtClean="0"/>
-              <a:t>Models and Data Binding</a:t>
-            </a:r>
-            <a:endParaRPr lang="en-US" dirty="0"/>
-          </a:p>
-        </p:txBody>
-      </p:sp>
-      <p:sp>
-        <p:nvSpPr>
-          <p:cNvPr id="4" name="Subtitle 3"/>
-          <p:cNvSpPr>
-            <a:spLocks noGrp="1"/>
-          </p:cNvSpPr>
-          <p:nvPr>
-            <p:ph type="subTitle" idx="1"/>
-          </p:nvPr>
-        </p:nvSpPr>
-        <p:spPr/>
-        <p:txBody>
-          <a:bodyPr/>
-          <a:lstStyle/>
-          <a:p>
-            <a:endParaRPr lang="en-US" dirty="0"/>
+            <a:endParaRPr lang="en-US"/>
           </a:p>
         </p:txBody>
       </p:sp>
     </p:spTree>
     <p:extLst>
       <p:ext uri="{BB962C8B-B14F-4D97-AF65-F5344CB8AC3E}">
-        <p14:creationId xmlns:p14="http://schemas.microsoft.com/office/powerpoint/2010/main" val="3414015979"/>
+        <p14:creationId xmlns:p14="http://schemas.microsoft.com/office/powerpoint/2010/main" val="2395234003"/>
       </p:ext>
     </p:extLst>
   </p:cSld>
@@ -4624,12 +4835,12 @@
       </p:grpSpPr>
       <p:sp>
         <p:nvSpPr>
-          <p:cNvPr id="2" name="Title 1"/>
-          <p:cNvSpPr>
-            <a:spLocks noGrp="1"/>
-          </p:cNvSpPr>
-          <p:nvPr>
-            <p:ph type="title"/>
+          <p:cNvPr id="5" name="Text Placeholder 4"/>
+          <p:cNvSpPr>
+            <a:spLocks noGrp="1"/>
+          </p:cNvSpPr>
+          <p:nvPr>
+            <p:ph type="body" sz="quarter" idx="10"/>
           </p:nvPr>
         </p:nvSpPr>
         <p:spPr/>
@@ -4639,7 +4850,7 @@
           <a:p>
             <a:r>
               <a:rPr lang="en-US" dirty="0" smtClean="0"/>
-              <a:t>$scope</a:t>
+              <a:t>Models and Data Binding</a:t>
             </a:r>
             <a:endParaRPr lang="en-US" dirty="0"/>
           </a:p>
@@ -4647,43 +4858,18 @@
       </p:sp>
       <p:sp>
         <p:nvSpPr>
-          <p:cNvPr id="3" name="Content Placeholder 2"/>
-          <p:cNvSpPr>
-            <a:spLocks noGrp="1"/>
-          </p:cNvSpPr>
-          <p:nvPr>
-            <p:ph sz="quarter" idx="10"/>
+          <p:cNvPr id="4" name="Subtitle 3"/>
+          <p:cNvSpPr>
+            <a:spLocks noGrp="1"/>
+          </p:cNvSpPr>
+          <p:nvPr>
+            <p:ph type="subTitle" idx="1"/>
           </p:nvPr>
         </p:nvSpPr>
         <p:spPr/>
         <p:txBody>
           <a:bodyPr/>
           <a:lstStyle/>
-          <a:p>
-            <a:r>
-              <a:rPr lang="en-US" dirty="0" smtClean="0"/>
-              <a:t>Links your controller to your view (what the user sees)</a:t>
-            </a:r>
-          </a:p>
-          <a:p>
-            <a:r>
-              <a:rPr lang="en-US" dirty="0" smtClean="0"/>
-              <a:t>Created through as an injectable parameter in controllers</a:t>
-            </a:r>
-          </a:p>
-          <a:p>
-            <a:r>
-              <a:rPr lang="en-US" dirty="0" smtClean="0"/>
-              <a:t>Configured within controller logic</a:t>
-            </a:r>
-            <a:endParaRPr lang="en-US" dirty="0"/>
-          </a:p>
-          <a:p>
-            <a:r>
-              <a:rPr lang="en-US" dirty="0"/>
-              <a:t>Contains the models for our data</a:t>
-            </a:r>
-          </a:p>
           <a:p>
             <a:endParaRPr lang="en-US" dirty="0"/>
           </a:p>
@@ -4692,7 +4878,7 @@
     </p:spTree>
     <p:extLst>
       <p:ext uri="{BB962C8B-B14F-4D97-AF65-F5344CB8AC3E}">
-        <p14:creationId xmlns:p14="http://schemas.microsoft.com/office/powerpoint/2010/main" val="425907335"/>
+        <p14:creationId xmlns:p14="http://schemas.microsoft.com/office/powerpoint/2010/main" val="3414015979"/>
       </p:ext>
     </p:extLst>
   </p:cSld>
@@ -4736,7 +4922,7 @@
           <a:p>
             <a:r>
               <a:rPr lang="en-US" dirty="0" smtClean="0"/>
-              <a:t>Displaying and Binding Data</a:t>
+              <a:t>$scope</a:t>
             </a:r>
             <a:endParaRPr lang="en-US" dirty="0"/>
           </a:p>
@@ -4759,54 +4945,27 @@
           <a:p>
             <a:r>
               <a:rPr lang="en-US" dirty="0" smtClean="0"/>
-              <a:t>Display using double braces {{ }}</a:t>
-            </a:r>
-          </a:p>
-          <a:p>
+              <a:t>Links your controller to your view (what the user sees)</a:t>
+            </a:r>
+          </a:p>
+          <a:p>
+            <a:r>
+              <a:rPr lang="en-US" dirty="0" smtClean="0"/>
+              <a:t>Created through as an injectable parameter in controllers</a:t>
+            </a:r>
+          </a:p>
+          <a:p>
+            <a:r>
+              <a:rPr lang="en-US" dirty="0" smtClean="0"/>
+              <a:t>Configured within controller logic</a:t>
+            </a:r>
             <a:endParaRPr lang="en-US" dirty="0"/>
           </a:p>
           <a:p>
             <a:r>
-              <a:rPr lang="en-US" dirty="0" smtClean="0"/>
-              <a:t>Bind data using directives:</a:t>
-            </a:r>
-          </a:p>
-          <a:p>
-            <a:pPr lvl="1"/>
-            <a:r>
-              <a:rPr lang="en-US" dirty="0" err="1" smtClean="0"/>
-              <a:t>ng</a:t>
-            </a:r>
-            <a:r>
-              <a:rPr lang="en-US" dirty="0" smtClean="0"/>
-              <a:t>-model for two way data binding</a:t>
-            </a:r>
-          </a:p>
-          <a:p>
-            <a:pPr lvl="1"/>
-            <a:r>
-              <a:rPr lang="en-US" dirty="0" err="1" smtClean="0"/>
-              <a:t>ng</a:t>
-            </a:r>
-            <a:r>
-              <a:rPr lang="en-US" dirty="0" smtClean="0"/>
-              <a:t>-bind for one way data binding</a:t>
-            </a:r>
-          </a:p>
-          <a:p>
-            <a:pPr marL="457046" lvl="1" indent="0">
-              <a:buNone/>
-            </a:pPr>
-            <a:endParaRPr lang="en-US" dirty="0" smtClean="0"/>
-          </a:p>
-          <a:p>
-            <a:pPr marL="457046" lvl="1" indent="0">
-              <a:buNone/>
-            </a:pPr>
-            <a:endParaRPr lang="en-US" dirty="0" smtClean="0"/>
-          </a:p>
-          <a:p>
-            <a:endParaRPr lang="en-US" dirty="0" smtClean="0"/>
+              <a:rPr lang="en-US" dirty="0"/>
+              <a:t>Contains the models for our data</a:t>
+            </a:r>
           </a:p>
           <a:p>
             <a:endParaRPr lang="en-US" dirty="0"/>
@@ -4816,7 +4975,7 @@
     </p:spTree>
     <p:extLst>
       <p:ext uri="{BB962C8B-B14F-4D97-AF65-F5344CB8AC3E}">
-        <p14:creationId xmlns:p14="http://schemas.microsoft.com/office/powerpoint/2010/main" val="4230835611"/>
+        <p14:creationId xmlns:p14="http://schemas.microsoft.com/office/powerpoint/2010/main" val="425907335"/>
       </p:ext>
     </p:extLst>
   </p:cSld>
@@ -4845,12 +5004,12 @@
       </p:grpSpPr>
       <p:sp>
         <p:nvSpPr>
-          <p:cNvPr id="5" name="Text Placeholder 4"/>
-          <p:cNvSpPr>
-            <a:spLocks noGrp="1"/>
-          </p:cNvSpPr>
-          <p:nvPr>
-            <p:ph type="body" sz="quarter" idx="10"/>
+          <p:cNvPr id="2" name="Title 1"/>
+          <p:cNvSpPr>
+            <a:spLocks noGrp="1"/>
+          </p:cNvSpPr>
+          <p:nvPr>
+            <p:ph type="title"/>
           </p:nvPr>
         </p:nvSpPr>
         <p:spPr/>
@@ -4860,7 +5019,7 @@
           <a:p>
             <a:r>
               <a:rPr lang="en-US" dirty="0" smtClean="0"/>
-              <a:t>Front End Routing</a:t>
+              <a:t>Displaying and Binding Data</a:t>
             </a:r>
             <a:endParaRPr lang="en-US" dirty="0"/>
           </a:p>
@@ -4868,18 +5027,70 @@
       </p:sp>
       <p:sp>
         <p:nvSpPr>
-          <p:cNvPr id="4" name="Subtitle 3"/>
-          <p:cNvSpPr>
-            <a:spLocks noGrp="1"/>
-          </p:cNvSpPr>
-          <p:nvPr>
-            <p:ph type="subTitle" idx="1"/>
+          <p:cNvPr id="3" name="Content Placeholder 2"/>
+          <p:cNvSpPr>
+            <a:spLocks noGrp="1"/>
+          </p:cNvSpPr>
+          <p:nvPr>
+            <p:ph sz="quarter" idx="10"/>
           </p:nvPr>
         </p:nvSpPr>
         <p:spPr/>
         <p:txBody>
           <a:bodyPr/>
           <a:lstStyle/>
+          <a:p>
+            <a:r>
+              <a:rPr lang="en-US" dirty="0" smtClean="0"/>
+              <a:t>Display using double braces {{ }}</a:t>
+            </a:r>
+          </a:p>
+          <a:p>
+            <a:endParaRPr lang="en-US" dirty="0"/>
+          </a:p>
+          <a:p>
+            <a:r>
+              <a:rPr lang="en-US" dirty="0" smtClean="0"/>
+              <a:t>Bind data using directives:</a:t>
+            </a:r>
+          </a:p>
+          <a:p>
+            <a:pPr lvl="1"/>
+            <a:r>
+              <a:rPr lang="en-US" dirty="0" err="1" smtClean="0"/>
+              <a:t>ng</a:t>
+            </a:r>
+            <a:r>
+              <a:rPr lang="en-US" dirty="0" smtClean="0"/>
+              <a:t>-model for two way data binding</a:t>
+            </a:r>
+          </a:p>
+          <a:p>
+            <a:pPr lvl="1"/>
+            <a:r>
+              <a:rPr lang="en-US" dirty="0" err="1" smtClean="0"/>
+              <a:t>ng</a:t>
+            </a:r>
+            <a:r>
+              <a:rPr lang="en-US" dirty="0" smtClean="0"/>
+              <a:t>-bind for one way data binding</a:t>
+            </a:r>
+          </a:p>
+          <a:p>
+            <a:pPr marL="457046" lvl="1" indent="0">
+              <a:buNone/>
+            </a:pPr>
+            <a:endParaRPr lang="en-US" dirty="0" smtClean="0"/>
+          </a:p>
+          <a:p>
+            <a:pPr marL="457046" lvl="1" indent="0">
+              <a:buNone/>
+            </a:pPr>
+            <a:endParaRPr lang="en-US" dirty="0" smtClean="0"/>
+          </a:p>
+          <a:p>
+            <a:endParaRPr lang="en-US" dirty="0" smtClean="0"/>
+          </a:p>
           <a:p>
             <a:endParaRPr lang="en-US" dirty="0"/>
           </a:p>
@@ -4888,7 +5099,7 @@
     </p:spTree>
     <p:extLst>
       <p:ext uri="{BB962C8B-B14F-4D97-AF65-F5344CB8AC3E}">
-        <p14:creationId xmlns:p14="http://schemas.microsoft.com/office/powerpoint/2010/main" val="2674971135"/>
+        <p14:creationId xmlns:p14="http://schemas.microsoft.com/office/powerpoint/2010/main" val="4230835611"/>
       </p:ext>
     </p:extLst>
   </p:cSld>
@@ -4930,71 +5141,14 @@
           <a:bodyPr/>
           <a:lstStyle/>
           <a:p>
-            <a:r>
-              <a:rPr lang="en-US" dirty="0" smtClean="0"/>
-              <a:t>Routing</a:t>
-            </a:r>
-            <a:endParaRPr lang="en-US" dirty="0"/>
-          </a:p>
-        </p:txBody>
-      </p:sp>
-      <p:sp>
-        <p:nvSpPr>
-          <p:cNvPr id="3" name="Content Placeholder 2"/>
-          <p:cNvSpPr>
-            <a:spLocks noGrp="1"/>
-          </p:cNvSpPr>
-          <p:nvPr>
-            <p:ph sz="quarter" idx="10"/>
-          </p:nvPr>
-        </p:nvSpPr>
-        <p:spPr/>
-        <p:txBody>
-          <a:bodyPr/>
-          <a:lstStyle/>
-          <a:p>
-            <a:r>
-              <a:rPr lang="en-US" dirty="0" smtClean="0"/>
-              <a:t>Create app with multiple views</a:t>
-            </a:r>
-          </a:p>
-          <a:p>
-            <a:r>
-              <a:rPr lang="en-US" dirty="0" smtClean="0"/>
-              <a:t>Must pass `</a:t>
-            </a:r>
-            <a:r>
-              <a:rPr lang="en-US" dirty="0" err="1" smtClean="0"/>
-              <a:t>ngRoute</a:t>
-            </a:r>
-            <a:r>
-              <a:rPr lang="en-US" dirty="0" smtClean="0"/>
-              <a:t>` module to app</a:t>
-            </a:r>
-          </a:p>
-          <a:p>
-            <a:r>
-              <a:rPr lang="en-US" dirty="0" smtClean="0"/>
-              <a:t>Detects </a:t>
-            </a:r>
-            <a:r>
-              <a:rPr lang="en-US" dirty="0" err="1" smtClean="0"/>
-              <a:t>url</a:t>
-            </a:r>
-            <a:r>
-              <a:rPr lang="en-US" dirty="0" smtClean="0"/>
-              <a:t> and uses the appropriate template</a:t>
-            </a:r>
-          </a:p>
-          <a:p>
-            <a:endParaRPr lang="en-US" dirty="0" smtClean="0"/>
+            <a:endParaRPr lang="en-US"/>
           </a:p>
         </p:txBody>
       </p:sp>
     </p:spTree>
     <p:extLst>
       <p:ext uri="{BB962C8B-B14F-4D97-AF65-F5344CB8AC3E}">
-        <p14:creationId xmlns:p14="http://schemas.microsoft.com/office/powerpoint/2010/main" val="629807618"/>
+        <p14:creationId xmlns:p14="http://schemas.microsoft.com/office/powerpoint/2010/main" val="646290220"/>
       </p:ext>
     </p:extLst>
   </p:cSld>
@@ -5149,6 +5303,184 @@
       </p:grpSpPr>
       <p:sp>
         <p:nvSpPr>
+          <p:cNvPr id="5" name="Text Placeholder 4"/>
+          <p:cNvSpPr>
+            <a:spLocks noGrp="1"/>
+          </p:cNvSpPr>
+          <p:nvPr>
+            <p:ph type="body" sz="quarter" idx="10"/>
+          </p:nvPr>
+        </p:nvSpPr>
+        <p:spPr/>
+        <p:txBody>
+          <a:bodyPr/>
+          <a:lstStyle/>
+          <a:p>
+            <a:r>
+              <a:rPr lang="en-US" dirty="0" smtClean="0"/>
+              <a:t>Front End Routing</a:t>
+            </a:r>
+            <a:endParaRPr lang="en-US" dirty="0"/>
+          </a:p>
+        </p:txBody>
+      </p:sp>
+      <p:sp>
+        <p:nvSpPr>
+          <p:cNvPr id="4" name="Subtitle 3"/>
+          <p:cNvSpPr>
+            <a:spLocks noGrp="1"/>
+          </p:cNvSpPr>
+          <p:nvPr>
+            <p:ph type="subTitle" idx="1"/>
+          </p:nvPr>
+        </p:nvSpPr>
+        <p:spPr/>
+        <p:txBody>
+          <a:bodyPr/>
+          <a:lstStyle/>
+          <a:p>
+            <a:endParaRPr lang="en-US" dirty="0"/>
+          </a:p>
+        </p:txBody>
+      </p:sp>
+    </p:spTree>
+    <p:extLst>
+      <p:ext uri="{BB962C8B-B14F-4D97-AF65-F5344CB8AC3E}">
+        <p14:creationId xmlns:p14="http://schemas.microsoft.com/office/powerpoint/2010/main" val="2674971135"/>
+      </p:ext>
+    </p:extLst>
+  </p:cSld>
+  <p:clrMapOvr>
+    <a:masterClrMapping/>
+  </p:clrMapOvr>
+</p:sld>
+</file>
+
+<file path=ppt/slides/slide21.xml><?xml version="1.0" encoding="utf-8"?>
+<p:sld xmlns:a="http://schemas.openxmlformats.org/drawingml/2006/main" xmlns:r="http://schemas.openxmlformats.org/officeDocument/2006/relationships" xmlns:p="http://schemas.openxmlformats.org/presentationml/2006/main">
+  <p:cSld>
+    <p:spTree>
+      <p:nvGrpSpPr>
+        <p:cNvPr id="1" name=""/>
+        <p:cNvGrpSpPr/>
+        <p:nvPr/>
+      </p:nvGrpSpPr>
+      <p:grpSpPr>
+        <a:xfrm>
+          <a:off x="0" y="0"/>
+          <a:ext cx="0" cy="0"/>
+          <a:chOff x="0" y="0"/>
+          <a:chExt cx="0" cy="0"/>
+        </a:xfrm>
+      </p:grpSpPr>
+      <p:sp>
+        <p:nvSpPr>
+          <p:cNvPr id="2" name="Title 1"/>
+          <p:cNvSpPr>
+            <a:spLocks noGrp="1"/>
+          </p:cNvSpPr>
+          <p:nvPr>
+            <p:ph type="title"/>
+          </p:nvPr>
+        </p:nvSpPr>
+        <p:spPr/>
+        <p:txBody>
+          <a:bodyPr/>
+          <a:lstStyle/>
+          <a:p>
+            <a:r>
+              <a:rPr lang="en-US" dirty="0" smtClean="0"/>
+              <a:t>Routing</a:t>
+            </a:r>
+            <a:endParaRPr lang="en-US" dirty="0"/>
+          </a:p>
+        </p:txBody>
+      </p:sp>
+      <p:sp>
+        <p:nvSpPr>
+          <p:cNvPr id="3" name="Content Placeholder 2"/>
+          <p:cNvSpPr>
+            <a:spLocks noGrp="1"/>
+          </p:cNvSpPr>
+          <p:nvPr>
+            <p:ph sz="quarter" idx="10"/>
+          </p:nvPr>
+        </p:nvSpPr>
+        <p:spPr/>
+        <p:txBody>
+          <a:bodyPr/>
+          <a:lstStyle/>
+          <a:p>
+            <a:r>
+              <a:rPr lang="en-US" dirty="0" smtClean="0"/>
+              <a:t>Create app with multiple views</a:t>
+            </a:r>
+          </a:p>
+          <a:p>
+            <a:r>
+              <a:rPr lang="en-US" dirty="0" smtClean="0"/>
+              <a:t>Must pass `</a:t>
+            </a:r>
+            <a:r>
+              <a:rPr lang="en-US" dirty="0" err="1" smtClean="0"/>
+              <a:t>ngRoute</a:t>
+            </a:r>
+            <a:r>
+              <a:rPr lang="en-US" dirty="0" smtClean="0"/>
+              <a:t>` module to app</a:t>
+            </a:r>
+          </a:p>
+          <a:p>
+            <a:r>
+              <a:rPr lang="en-US" dirty="0" smtClean="0"/>
+              <a:t>Detects </a:t>
+            </a:r>
+            <a:r>
+              <a:rPr lang="en-US" dirty="0" err="1" smtClean="0"/>
+              <a:t>url</a:t>
+            </a:r>
+            <a:r>
+              <a:rPr lang="en-US" dirty="0" smtClean="0"/>
+              <a:t> and uses the appropriate template</a:t>
+            </a:r>
+          </a:p>
+          <a:p>
+            <a:endParaRPr lang="en-US" dirty="0" smtClean="0"/>
+          </a:p>
+        </p:txBody>
+      </p:sp>
+    </p:spTree>
+    <p:extLst>
+      <p:ext uri="{BB962C8B-B14F-4D97-AF65-F5344CB8AC3E}">
+        <p14:creationId xmlns:p14="http://schemas.microsoft.com/office/powerpoint/2010/main" val="629807618"/>
+      </p:ext>
+    </p:extLst>
+  </p:cSld>
+  <p:clrMapOvr>
+    <a:masterClrMapping/>
+  </p:clrMapOvr>
+</p:sld>
+</file>
+
+<file path=ppt/slides/slide22.xml><?xml version="1.0" encoding="utf-8"?>
+<p:sld xmlns:a="http://schemas.openxmlformats.org/drawingml/2006/main" xmlns:r="http://schemas.openxmlformats.org/officeDocument/2006/relationships" xmlns:p="http://schemas.openxmlformats.org/presentationml/2006/main">
+  <p:cSld>
+    <p:spTree>
+      <p:nvGrpSpPr>
+        <p:cNvPr id="1" name=""/>
+        <p:cNvGrpSpPr/>
+        <p:nvPr/>
+      </p:nvGrpSpPr>
+      <p:grpSpPr>
+        <a:xfrm>
+          <a:off x="0" y="0"/>
+          <a:ext cx="0" cy="0"/>
+          <a:chOff x="0" y="0"/>
+          <a:chExt cx="0" cy="0"/>
+        </a:xfrm>
+      </p:grpSpPr>
+      <p:sp>
+        <p:nvSpPr>
           <p:cNvPr id="2" name="Title 1"/>
           <p:cNvSpPr>
             <a:spLocks noGrp="1"/>
@@ -5205,7 +5537,7 @@
 </p:sld>
 </file>
 
-<file path=ppt/slides/slide21.xml><?xml version="1.0" encoding="utf-8"?>
+<file path=ppt/slides/slide23.xml><?xml version="1.0" encoding="utf-8"?>
 <p:sld xmlns:a="http://schemas.openxmlformats.org/drawingml/2006/main" xmlns:r="http://schemas.openxmlformats.org/officeDocument/2006/relationships" xmlns:p="http://schemas.openxmlformats.org/presentationml/2006/main">
   <p:cSld>
     <p:spTree>
@@ -6437,7 +6769,7 @@
   <a:extraClrSchemeLst/>
   <a:extLst>
     <a:ext uri="{05A4C25C-085E-4340-85A3-A5531E510DB2}">
-      <thm15:themeFamily xmlns="" xmlns:thm15="http://schemas.microsoft.com/office/thememl/2012/main" name="Office Theme" id="{62F939B6-93AF-4DB8-9C6B-D6C7DFDC589F}" vid="{4A3C46E8-61CC-4603-A589-7422A47A8E4A}"/>
+      <thm15:themeFamily xmlns:thm15="http://schemas.microsoft.com/office/thememl/2012/main" xmlns="" name="Office Theme" id="{62F939B6-93AF-4DB8-9C6B-D6C7DFDC589F}" vid="{4A3C46E8-61CC-4603-A589-7422A47A8E4A}"/>
     </a:ext>
   </a:extLst>
 </a:theme>
@@ -6698,7 +7030,7 @@
   <a:extraClrSchemeLst/>
   <a:extLst>
     <a:ext uri="{05A4C25C-085E-4340-85A3-A5531E510DB2}">
-      <thm15:themeFamily xmlns="" xmlns:thm15="http://schemas.microsoft.com/office/thememl/2012/main" name="Office Theme" id="{62F939B6-93AF-4DB8-9C6B-D6C7DFDC589F}" vid="{4A3C46E8-61CC-4603-A589-7422A47A8E4A}"/>
+      <thm15:themeFamily xmlns:thm15="http://schemas.microsoft.com/office/thememl/2012/main" xmlns="" name="Office Theme" id="{62F939B6-93AF-4DB8-9C6B-D6C7DFDC589F}" vid="{4A3C46E8-61CC-4603-A589-7422A47A8E4A}"/>
     </a:ext>
   </a:extLst>
 </a:theme>

</xml_diff>

<commit_message>
pacing modules and slides
</commit_message>
<xml_diff>
--- a/slides/module2.pptx
+++ b/slides/module2.pptx
@@ -5,10 +5,10 @@
     <p:sldMasterId id="2147483660" r:id="rId4"/>
   </p:sldMasterIdLst>
   <p:notesMasterIdLst>
-    <p:notesMasterId r:id="rId28"/>
+    <p:notesMasterId r:id="rId29"/>
   </p:notesMasterIdLst>
   <p:handoutMasterIdLst>
-    <p:handoutMasterId r:id="rId29"/>
+    <p:handoutMasterId r:id="rId30"/>
   </p:handoutMasterIdLst>
   <p:sldIdLst>
     <p:sldId id="277" r:id="rId5"/>
@@ -33,7 +33,8 @@
     <p:sldId id="299" r:id="rId24"/>
     <p:sldId id="302" r:id="rId25"/>
     <p:sldId id="310" r:id="rId26"/>
-    <p:sldId id="269" r:id="rId27"/>
+    <p:sldId id="313" r:id="rId27"/>
+    <p:sldId id="269" r:id="rId28"/>
   </p:sldIdLst>
   <p:sldSz cx="12192000" cy="6858000"/>
   <p:notesSz cx="6858000" cy="9144000"/>
@@ -1405,13 +1406,9 @@
             </a:r>
             <a:r>
               <a:rPr lang="en-US" baseline="0" dirty="0" smtClean="0"/>
-              <a:t>, and a </a:t>
-            </a:r>
-            <a:r>
-              <a:rPr lang="en-US" baseline="0" smtClean="0"/>
-              <a:t>posting function</a:t>
-            </a:r>
-            <a:endParaRPr lang="en-US"/>
+              <a:t>, and a posting function</a:t>
+            </a:r>
+            <a:endParaRPr lang="en-US" dirty="0"/>
           </a:p>
         </p:txBody>
       </p:sp>
@@ -1442,6 +1439,134 @@
     <p:extLst>
       <p:ext uri="{BB962C8B-B14F-4D97-AF65-F5344CB8AC3E}">
         <p14:creationId xmlns:p14="http://schemas.microsoft.com/office/powerpoint/2010/main" val="1048017110"/>
+      </p:ext>
+    </p:extLst>
+  </p:cSld>
+  <p:clrMapOvr>
+    <a:masterClrMapping/>
+  </p:clrMapOvr>
+</p:notes>
+</file>
+
+<file path=ppt/notesSlides/notesSlide9.xml><?xml version="1.0" encoding="utf-8"?>
+<p:notes xmlns:a="http://schemas.openxmlformats.org/drawingml/2006/main" xmlns:r="http://schemas.openxmlformats.org/officeDocument/2006/relationships" xmlns:p="http://schemas.openxmlformats.org/presentationml/2006/main">
+  <p:cSld>
+    <p:spTree>
+      <p:nvGrpSpPr>
+        <p:cNvPr id="1" name=""/>
+        <p:cNvGrpSpPr/>
+        <p:nvPr/>
+      </p:nvGrpSpPr>
+      <p:grpSpPr>
+        <a:xfrm>
+          <a:off x="0" y="0"/>
+          <a:ext cx="0" cy="0"/>
+          <a:chOff x="0" y="0"/>
+          <a:chExt cx="0" cy="0"/>
+        </a:xfrm>
+      </p:grpSpPr>
+      <p:sp>
+        <p:nvSpPr>
+          <p:cNvPr id="2" name="Slide Image Placeholder 1"/>
+          <p:cNvSpPr>
+            <a:spLocks noGrp="1" noRot="1" noChangeAspect="1"/>
+          </p:cNvSpPr>
+          <p:nvPr>
+            <p:ph type="sldImg"/>
+          </p:nvPr>
+        </p:nvSpPr>
+        <p:spPr/>
+      </p:sp>
+      <p:sp>
+        <p:nvSpPr>
+          <p:cNvPr id="3" name="Notes Placeholder 2"/>
+          <p:cNvSpPr>
+            <a:spLocks noGrp="1"/>
+          </p:cNvSpPr>
+          <p:nvPr>
+            <p:ph type="body" idx="1"/>
+          </p:nvPr>
+        </p:nvSpPr>
+        <p:spPr/>
+        <p:txBody>
+          <a:bodyPr/>
+          <a:lstStyle/>
+          <a:p>
+            <a:r>
+              <a:rPr lang="en-US" dirty="0" smtClean="0"/>
+              <a:t>Putting</a:t>
+            </a:r>
+            <a:r>
+              <a:rPr lang="en-US" baseline="0" dirty="0" smtClean="0"/>
+              <a:t> everything into partials</a:t>
+            </a:r>
+          </a:p>
+          <a:p>
+            <a:endParaRPr lang="en-US" baseline="0" dirty="0" smtClean="0"/>
+          </a:p>
+          <a:p>
+            <a:r>
+              <a:rPr lang="en-US" baseline="0" dirty="0" smtClean="0"/>
+              <a:t>Creating routes with </a:t>
+            </a:r>
+            <a:r>
+              <a:rPr lang="en-US" baseline="0" dirty="0" err="1" smtClean="0"/>
+              <a:t>ngRoute</a:t>
+            </a:r>
+            <a:endParaRPr lang="en-US" baseline="0" dirty="0" smtClean="0"/>
+          </a:p>
+          <a:p>
+            <a:endParaRPr lang="en-US" baseline="0" dirty="0" smtClean="0"/>
+          </a:p>
+          <a:p>
+            <a:r>
+              <a:rPr lang="en-US" baseline="0" dirty="0" smtClean="0"/>
+              <a:t>Putting everything in a server and </a:t>
+            </a:r>
+            <a:r>
+              <a:rPr lang="en-US" baseline="0" smtClean="0"/>
+              <a:t>showing main</a:t>
+            </a:r>
+            <a:endParaRPr lang="en-US" baseline="0" dirty="0" smtClean="0"/>
+          </a:p>
+          <a:p>
+            <a:endParaRPr lang="en-US" baseline="0" dirty="0" smtClean="0"/>
+          </a:p>
+          <a:p>
+            <a:r>
+              <a:rPr lang="en-US" baseline="0" dirty="0" smtClean="0"/>
+              <a:t>Adding in navigation.</a:t>
+            </a:r>
+          </a:p>
+        </p:txBody>
+      </p:sp>
+      <p:sp>
+        <p:nvSpPr>
+          <p:cNvPr id="4" name="Slide Number Placeholder 3"/>
+          <p:cNvSpPr>
+            <a:spLocks noGrp="1"/>
+          </p:cNvSpPr>
+          <p:nvPr>
+            <p:ph type="sldNum" sz="quarter" idx="10"/>
+          </p:nvPr>
+        </p:nvSpPr>
+        <p:spPr/>
+        <p:txBody>
+          <a:bodyPr/>
+          <a:lstStyle/>
+          <a:p>
+            <a:fld id="{4CFD207A-07DF-40AD-A916-9872E089CE7A}" type="slidenum">
+              <a:rPr lang="en-US" smtClean="0"/>
+              <a:t>23</a:t>
+            </a:fld>
+            <a:endParaRPr lang="en-US"/>
+          </a:p>
+        </p:txBody>
+      </p:sp>
+    </p:spTree>
+    <p:extLst>
+      <p:ext uri="{BB962C8B-B14F-4D97-AF65-F5344CB8AC3E}">
+        <p14:creationId xmlns:p14="http://schemas.microsoft.com/office/powerpoint/2010/main" val="711496997"/>
       </p:ext>
     </p:extLst>
   </p:cSld>
@@ -5519,8 +5644,27 @@
           <a:p>
             <a:r>
               <a:rPr lang="en-US" dirty="0" smtClean="0"/>
-              <a:t>Sections of the page to be rendered as-needed</a:t>
-            </a:r>
+              <a:t>Sections of the page to be rendered as-</a:t>
+            </a:r>
+            <a:r>
+              <a:rPr lang="en-US" dirty="0" smtClean="0"/>
+              <a:t>needed</a:t>
+            </a:r>
+          </a:p>
+          <a:p>
+            <a:r>
+              <a:rPr lang="en-US" dirty="0" smtClean="0"/>
+              <a:t>Rendered inside </a:t>
+            </a:r>
+            <a:r>
+              <a:rPr lang="en-US" dirty="0" err="1" smtClean="0"/>
+              <a:t>ng</a:t>
+            </a:r>
+            <a:r>
+              <a:rPr lang="en-US" dirty="0" smtClean="0"/>
+              <a:t>-view</a:t>
+            </a:r>
+            <a:endParaRPr lang="en-US" dirty="0" smtClean="0"/>
           </a:p>
         </p:txBody>
       </p:sp>
@@ -5538,6 +5682,55 @@
 </file>
 
 <file path=ppt/slides/slide23.xml><?xml version="1.0" encoding="utf-8"?>
+<p:sld xmlns:a="http://schemas.openxmlformats.org/drawingml/2006/main" xmlns:r="http://schemas.openxmlformats.org/officeDocument/2006/relationships" xmlns:p="http://schemas.openxmlformats.org/presentationml/2006/main">
+  <p:cSld>
+    <p:spTree>
+      <p:nvGrpSpPr>
+        <p:cNvPr id="1" name=""/>
+        <p:cNvGrpSpPr/>
+        <p:nvPr/>
+      </p:nvGrpSpPr>
+      <p:grpSpPr>
+        <a:xfrm>
+          <a:off x="0" y="0"/>
+          <a:ext cx="0" cy="0"/>
+          <a:chOff x="0" y="0"/>
+          <a:chExt cx="0" cy="0"/>
+        </a:xfrm>
+      </p:grpSpPr>
+      <p:sp>
+        <p:nvSpPr>
+          <p:cNvPr id="2" name="Title 1"/>
+          <p:cNvSpPr>
+            <a:spLocks noGrp="1"/>
+          </p:cNvSpPr>
+          <p:nvPr>
+            <p:ph type="title"/>
+          </p:nvPr>
+        </p:nvSpPr>
+        <p:spPr/>
+        <p:txBody>
+          <a:bodyPr/>
+          <a:lstStyle/>
+          <a:p>
+            <a:endParaRPr lang="en-US"/>
+          </a:p>
+        </p:txBody>
+      </p:sp>
+    </p:spTree>
+    <p:extLst>
+      <p:ext uri="{BB962C8B-B14F-4D97-AF65-F5344CB8AC3E}">
+        <p14:creationId xmlns:p14="http://schemas.microsoft.com/office/powerpoint/2010/main" val="2823375382"/>
+      </p:ext>
+    </p:extLst>
+  </p:cSld>
+  <p:clrMapOvr>
+    <a:masterClrMapping/>
+  </p:clrMapOvr>
+</p:sld>
+</file>
+
+<file path=ppt/slides/slide24.xml><?xml version="1.0" encoding="utf-8"?>
 <p:sld xmlns:a="http://schemas.openxmlformats.org/drawingml/2006/main" xmlns:r="http://schemas.openxmlformats.org/officeDocument/2006/relationships" xmlns:p="http://schemas.openxmlformats.org/presentationml/2006/main">
   <p:cSld>
     <p:spTree>

</xml_diff>